<commit_message>
level 4 stuff and pitch edits
</commit_message>
<xml_diff>
--- a/HelpUs/Documents/Pitch.pptx
+++ b/HelpUs/Documents/Pitch.pptx
@@ -104,6 +104,11 @@
       </a:defRPr>
     </a:lvl9pPr>
   </p:defaultTextStyle>
+  <p:extLst>
+    <p:ext uri="{EFAFB233-063F-42B5-8137-9DF3F51BA10A}">
+      <p15:sldGuideLst xmlns:p15="http://schemas.microsoft.com/office/powerpoint/2012/main"/>
+    </p:ext>
+  </p:extLst>
 </p:presentation>
 </file>
 
@@ -3356,8 +3361,8 @@
         </p:nvSpPr>
         <p:spPr>
           <a:xfrm>
-            <a:off x="0" y="696287"/>
-            <a:ext cx="12192000" cy="5078313"/>
+            <a:off x="0" y="1225689"/>
+            <a:ext cx="12192000" cy="5632311"/>
           </a:xfrm>
           <a:prstGeom prst="rect">
             <a:avLst/>
@@ -3370,14 +3375,12 @@
           </a:bodyPr>
           <a:lstStyle/>
           <a:p>
-            <a:pPr algn="ctr"/>
-            <a:r>
-              <a:rPr lang="en-AU" sz="3600" dirty="0"/>
+            <a:r>
+              <a:rPr lang="en-AU" sz="3600" b="1" u="sng" dirty="0"/>
               <a:t>Inversion</a:t>
             </a:r>
           </a:p>
           <a:p>
-            <a:pPr algn="ctr"/>
             <a:r>
               <a:rPr lang="en-AU" sz="3600" dirty="0"/>
               <a:t>Developed by </a:t>
@@ -3389,36 +3392,61 @@
             <a:endParaRPr lang="en-AU" sz="3600" dirty="0"/>
           </a:p>
           <a:p>
-            <a:pPr algn="ctr"/>
             <a:endParaRPr lang="en-AU" sz="3600" dirty="0"/>
           </a:p>
           <a:p>
-            <a:pPr algn="ctr"/>
             <a:r>
               <a:rPr lang="en-AU" sz="3600" dirty="0"/>
               <a:t>Puzzle game about reuniting the player with their reflection while travelling through a maze and solving puzzles.</a:t>
             </a:r>
           </a:p>
           <a:p>
-            <a:pPr algn="ctr"/>
             <a:endParaRPr lang="en-AU" sz="3600" dirty="0"/>
           </a:p>
           <a:p>
-            <a:pPr algn="ctr"/>
             <a:r>
               <a:rPr lang="en-AU" sz="3600" dirty="0"/>
-              <a:t>Today: Movement, Platform objects e.g. Doors, walls, buttons, Gravity?</a:t>
-            </a:r>
-          </a:p>
-          <a:p>
-            <a:pPr algn="ctr"/>
+              <a:t>Today: Movement, Platform objects e.g. Doors, walls, buttons, Gravity, 3 tutorial levels</a:t>
+            </a:r>
+          </a:p>
+          <a:p>
             <a:r>
               <a:rPr lang="en-AU" sz="3600" dirty="0"/>
-              <a:t>Tomorrow: Art</a:t>
-            </a:r>
-          </a:p>
-        </p:txBody>
-      </p:sp>
+              <a:t>Tomorrow: Game Art, camera zoom based on level, main levels, fix collision bouncing, background</a:t>
+            </a:r>
+          </a:p>
+        </p:txBody>
+      </p:sp>
+      <p:pic>
+        <p:nvPicPr>
+          <p:cNvPr id="2" name="Picture 1">
+            <a:extLst>
+              <a:ext uri="{FF2B5EF4-FFF2-40B4-BE49-F238E27FC236}">
+                <a16:creationId xmlns:a16="http://schemas.microsoft.com/office/drawing/2014/main" id="{D57130A4-EE1F-4CCA-A79D-AC991EA01F18}"/>
+              </a:ext>
+            </a:extLst>
+          </p:cNvPr>
+          <p:cNvPicPr>
+            <a:picLocks noChangeAspect="1"/>
+          </p:cNvPicPr>
+          <p:nvPr/>
+        </p:nvPicPr>
+        <p:blipFill>
+          <a:blip r:embed="rId2"/>
+          <a:stretch>
+            <a:fillRect/>
+          </a:stretch>
+        </p:blipFill>
+        <p:spPr>
+          <a:xfrm>
+            <a:off x="6668780" y="0"/>
+            <a:ext cx="3800155" cy="2530155"/>
+          </a:xfrm>
+          <a:prstGeom prst="rect">
+            <a:avLst/>
+          </a:prstGeom>
+        </p:spPr>
+      </p:pic>
     </p:spTree>
     <p:extLst>
       <p:ext uri="{BB962C8B-B14F-4D97-AF65-F5344CB8AC3E}">

</xml_diff>